<commit_message>
Added qpcr data. Added new OD samples. Figure improvements.
</commit_message>
<xml_diff>
--- a/Figures.pptx
+++ b/Figures.pptx
@@ -6,7 +6,8 @@
   </p:sldMasterIdLst>
   <p:sldIdLst>
     <p:sldId id="256" r:id="rId2"/>
-    <p:sldId id="257" r:id="rId3"/>
+    <p:sldId id="258" r:id="rId3"/>
+    <p:sldId id="257" r:id="rId4"/>
   </p:sldIdLst>
   <p:sldSz cx="18562638" cy="18288000"/>
   <p:notesSz cx="6858000" cy="9144000"/>
@@ -105,6 +106,11 @@
       </a:defRPr>
     </a:lvl9pPr>
   </p:defaultTextStyle>
+  <p:extLst>
+    <p:ext uri="{EFAFB233-063F-42B5-8137-9DF3F51BA10A}">
+      <p15:sldGuideLst xmlns:p15="http://schemas.microsoft.com/office/powerpoint/2012/main"/>
+    </p:ext>
+  </p:extLst>
 </p:presentation>
 </file>
 
@@ -239,7 +245,7 @@
           <a:p>
             <a:fld id="{AAEC4A40-A4AF-4D07-B5DE-5231CAC44A4C}" type="datetimeFigureOut">
               <a:rPr lang="en-US" smtClean="0"/>
-              <a:t>9/3/2020</a:t>
+              <a:t>10/30/2020</a:t>
             </a:fld>
             <a:endParaRPr lang="en-US"/>
           </a:p>
@@ -409,7 +415,7 @@
           <a:p>
             <a:fld id="{AAEC4A40-A4AF-4D07-B5DE-5231CAC44A4C}" type="datetimeFigureOut">
               <a:rPr lang="en-US" smtClean="0"/>
-              <a:t>9/3/2020</a:t>
+              <a:t>10/30/2020</a:t>
             </a:fld>
             <a:endParaRPr lang="en-US"/>
           </a:p>
@@ -589,7 +595,7 @@
           <a:p>
             <a:fld id="{AAEC4A40-A4AF-4D07-B5DE-5231CAC44A4C}" type="datetimeFigureOut">
               <a:rPr lang="en-US" smtClean="0"/>
-              <a:t>9/3/2020</a:t>
+              <a:t>10/30/2020</a:t>
             </a:fld>
             <a:endParaRPr lang="en-US"/>
           </a:p>
@@ -759,7 +765,7 @@
           <a:p>
             <a:fld id="{AAEC4A40-A4AF-4D07-B5DE-5231CAC44A4C}" type="datetimeFigureOut">
               <a:rPr lang="en-US" smtClean="0"/>
-              <a:t>9/3/2020</a:t>
+              <a:t>10/30/2020</a:t>
             </a:fld>
             <a:endParaRPr lang="en-US"/>
           </a:p>
@@ -1003,7 +1009,7 @@
           <a:p>
             <a:fld id="{AAEC4A40-A4AF-4D07-B5DE-5231CAC44A4C}" type="datetimeFigureOut">
               <a:rPr lang="en-US" smtClean="0"/>
-              <a:t>9/3/2020</a:t>
+              <a:t>10/30/2020</a:t>
             </a:fld>
             <a:endParaRPr lang="en-US"/>
           </a:p>
@@ -1235,7 +1241,7 @@
           <a:p>
             <a:fld id="{AAEC4A40-A4AF-4D07-B5DE-5231CAC44A4C}" type="datetimeFigureOut">
               <a:rPr lang="en-US" smtClean="0"/>
-              <a:t>9/3/2020</a:t>
+              <a:t>10/30/2020</a:t>
             </a:fld>
             <a:endParaRPr lang="en-US"/>
           </a:p>
@@ -1602,7 +1608,7 @@
           <a:p>
             <a:fld id="{AAEC4A40-A4AF-4D07-B5DE-5231CAC44A4C}" type="datetimeFigureOut">
               <a:rPr lang="en-US" smtClean="0"/>
-              <a:t>9/3/2020</a:t>
+              <a:t>10/30/2020</a:t>
             </a:fld>
             <a:endParaRPr lang="en-US"/>
           </a:p>
@@ -1720,7 +1726,7 @@
           <a:p>
             <a:fld id="{AAEC4A40-A4AF-4D07-B5DE-5231CAC44A4C}" type="datetimeFigureOut">
               <a:rPr lang="en-US" smtClean="0"/>
-              <a:t>9/3/2020</a:t>
+              <a:t>10/30/2020</a:t>
             </a:fld>
             <a:endParaRPr lang="en-US"/>
           </a:p>
@@ -1815,7 +1821,7 @@
           <a:p>
             <a:fld id="{AAEC4A40-A4AF-4D07-B5DE-5231CAC44A4C}" type="datetimeFigureOut">
               <a:rPr lang="en-US" smtClean="0"/>
-              <a:t>9/3/2020</a:t>
+              <a:t>10/30/2020</a:t>
             </a:fld>
             <a:endParaRPr lang="en-US"/>
           </a:p>
@@ -2092,7 +2098,7 @@
           <a:p>
             <a:fld id="{AAEC4A40-A4AF-4D07-B5DE-5231CAC44A4C}" type="datetimeFigureOut">
               <a:rPr lang="en-US" smtClean="0"/>
-              <a:t>9/3/2020</a:t>
+              <a:t>10/30/2020</a:t>
             </a:fld>
             <a:endParaRPr lang="en-US"/>
           </a:p>
@@ -2349,7 +2355,7 @@
           <a:p>
             <a:fld id="{AAEC4A40-A4AF-4D07-B5DE-5231CAC44A4C}" type="datetimeFigureOut">
               <a:rPr lang="en-US" smtClean="0"/>
-              <a:t>9/3/2020</a:t>
+              <a:t>10/30/2020</a:t>
             </a:fld>
             <a:endParaRPr lang="en-US"/>
           </a:p>
@@ -2562,7 +2568,7 @@
           <a:p>
             <a:fld id="{AAEC4A40-A4AF-4D07-B5DE-5231CAC44A4C}" type="datetimeFigureOut">
               <a:rPr lang="en-US" smtClean="0"/>
-              <a:t>9/3/2020</a:t>
+              <a:t>10/30/2020</a:t>
             </a:fld>
             <a:endParaRPr lang="en-US"/>
           </a:p>
@@ -3021,7 +3027,7 @@
         </p:nvSpPr>
         <p:spPr>
           <a:xfrm>
-            <a:off x="125667" y="5763264"/>
+            <a:off x="125667" y="5778504"/>
             <a:ext cx="2307979" cy="861774"/>
           </a:xfrm>
           <a:prstGeom prst="rect">
@@ -3061,7 +3067,7 @@
         </p:nvSpPr>
         <p:spPr>
           <a:xfrm>
-            <a:off x="5992808" y="5763264"/>
+            <a:off x="6510968" y="5778504"/>
             <a:ext cx="2598742" cy="861774"/>
           </a:xfrm>
           <a:prstGeom prst="rect">
@@ -3101,7 +3107,7 @@
         </p:nvSpPr>
         <p:spPr>
           <a:xfrm>
-            <a:off x="10416920" y="5763264"/>
+            <a:off x="12132328" y="5778504"/>
             <a:ext cx="2307788" cy="861774"/>
           </a:xfrm>
           <a:prstGeom prst="rect">
@@ -3129,10 +3135,10 @@
       </p:sp>
       <p:pic>
         <p:nvPicPr>
-          <p:cNvPr id="1034" name="Picture 10">
+          <p:cNvPr id="1026" name="Picture 2">
             <a:extLst>
               <a:ext uri="{FF2B5EF4-FFF2-40B4-BE49-F238E27FC236}">
-                <a16:creationId xmlns:a16="http://schemas.microsoft.com/office/drawing/2014/main" id="{70DBF4F1-C689-4135-A860-1A5D3601B036}"/>
+                <a16:creationId xmlns:a16="http://schemas.microsoft.com/office/drawing/2014/main" id="{6203C510-BD56-46DF-A531-EA8606E09C3E}"/>
               </a:ext>
             </a:extLst>
           </p:cNvPr>
@@ -3156,7 +3162,7 @@
         </p:blipFill>
         <p:spPr bwMode="auto">
           <a:xfrm>
-            <a:off x="844891" y="1150832"/>
+            <a:off x="460667" y="1501432"/>
             <a:ext cx="10401300" cy="4314825"/>
           </a:xfrm>
           <a:prstGeom prst="rect">
@@ -3176,10 +3182,10 @@
       </p:pic>
       <p:pic>
         <p:nvPicPr>
-          <p:cNvPr id="1036" name="Picture 12">
+          <p:cNvPr id="2" name="Picture 2">
             <a:extLst>
               <a:ext uri="{FF2B5EF4-FFF2-40B4-BE49-F238E27FC236}">
-                <a16:creationId xmlns:a16="http://schemas.microsoft.com/office/drawing/2014/main" id="{1BF92450-5971-4EF1-B7BD-0381DC656F25}"/>
+                <a16:creationId xmlns:a16="http://schemas.microsoft.com/office/drawing/2014/main" id="{8CD723C9-BCC5-4410-B573-0CEDDAD7D44B}"/>
               </a:ext>
             </a:extLst>
           </p:cNvPr>
@@ -3203,8 +3209,8 @@
         </p:blipFill>
         <p:spPr bwMode="auto">
           <a:xfrm>
-            <a:off x="751582" y="6590096"/>
-            <a:ext cx="5086350" cy="4295775"/>
+            <a:off x="460667" y="6640278"/>
+            <a:ext cx="5724525" cy="4295775"/>
           </a:xfrm>
           <a:prstGeom prst="rect">
             <a:avLst/>
@@ -3223,10 +3229,10 @@
       </p:pic>
       <p:pic>
         <p:nvPicPr>
-          <p:cNvPr id="1038" name="Picture 14">
+          <p:cNvPr id="3" name="Picture 4">
             <a:extLst>
               <a:ext uri="{FF2B5EF4-FFF2-40B4-BE49-F238E27FC236}">
-                <a16:creationId xmlns:a16="http://schemas.microsoft.com/office/drawing/2014/main" id="{DE86B5F2-5379-4B46-8E2B-02C876EF17DB}"/>
+                <a16:creationId xmlns:a16="http://schemas.microsoft.com/office/drawing/2014/main" id="{08A9B009-68FC-4717-92A2-9DFB8460919B}"/>
               </a:ext>
             </a:extLst>
           </p:cNvPr>
@@ -3250,8 +3256,8 @@
         </p:blipFill>
         <p:spPr bwMode="auto">
           <a:xfrm>
-            <a:off x="6308075" y="6625038"/>
-            <a:ext cx="4238625" cy="4314825"/>
+            <a:off x="6510968" y="6732365"/>
+            <a:ext cx="4876800" cy="4314825"/>
           </a:xfrm>
           <a:prstGeom prst="rect">
             <a:avLst/>
@@ -3270,10 +3276,10 @@
       </p:pic>
       <p:pic>
         <p:nvPicPr>
-          <p:cNvPr id="1040" name="Picture 16">
+          <p:cNvPr id="8" name="Picture 2">
             <a:extLst>
               <a:ext uri="{FF2B5EF4-FFF2-40B4-BE49-F238E27FC236}">
-                <a16:creationId xmlns:a16="http://schemas.microsoft.com/office/drawing/2014/main" id="{624A803A-DBDA-491B-818F-E4EFFB1B9192}"/>
+                <a16:creationId xmlns:a16="http://schemas.microsoft.com/office/drawing/2014/main" id="{B79B846D-81BC-4FDC-98BC-75F828439618}"/>
               </a:ext>
             </a:extLst>
           </p:cNvPr>
@@ -3297,8 +3303,8 @@
         </p:blipFill>
         <p:spPr bwMode="auto">
           <a:xfrm>
-            <a:off x="10861967" y="6766308"/>
-            <a:ext cx="2743200" cy="3943350"/>
+            <a:off x="12132328" y="6640278"/>
+            <a:ext cx="5381625" cy="4171950"/>
           </a:xfrm>
           <a:prstGeom prst="rect">
             <a:avLst/>
@@ -3345,12 +3351,74 @@
           <a:chExt cx="0" cy="0"/>
         </a:xfrm>
       </p:grpSpPr>
+      <p:sp>
+        <p:nvSpPr>
+          <p:cNvPr id="5" name="TextBox 4">
+            <a:extLst>
+              <a:ext uri="{FF2B5EF4-FFF2-40B4-BE49-F238E27FC236}">
+                <a16:creationId xmlns:a16="http://schemas.microsoft.com/office/drawing/2014/main" id="{D633D3B2-A014-406B-AE2A-70CF115301D0}"/>
+              </a:ext>
+            </a:extLst>
+          </p:cNvPr>
+          <p:cNvSpPr txBox="1"/>
+          <p:nvPr/>
+        </p:nvSpPr>
+        <p:spPr>
+          <a:xfrm>
+            <a:off x="125667" y="243784"/>
+            <a:ext cx="7863301" cy="1077218"/>
+          </a:xfrm>
+          <a:prstGeom prst="rect">
+            <a:avLst/>
+          </a:prstGeom>
+          <a:noFill/>
+        </p:spPr>
+        <p:txBody>
+          <a:bodyPr wrap="square" rtlCol="0">
+            <a:spAutoFit/>
+          </a:bodyPr>
+          <a:lstStyle/>
+          <a:p>
+            <a:r>
+              <a:rPr lang="en-US" sz="4400" b="1" dirty="0"/>
+              <a:t>a</a:t>
+            </a:r>
+            <a:r>
+              <a:rPr lang="en-US" sz="4400" dirty="0"/>
+              <a:t>) </a:t>
+            </a:r>
+            <a:r>
+              <a:rPr lang="en-US" sz="4400" i="1" dirty="0"/>
+              <a:t>E. faecalis </a:t>
+            </a:r>
+            <a:r>
+              <a:rPr lang="en-US" sz="4400" dirty="0"/>
+              <a:t>YI6</a:t>
+            </a:r>
+          </a:p>
+          <a:p>
+            <a:r>
+              <a:rPr lang="en-US" sz="2000" dirty="0"/>
+              <a:t>	Individual phages </a:t>
+            </a:r>
+            <a:r>
+              <a:rPr lang="en-US" sz="2000" b="1" dirty="0"/>
+              <a:t>don’t</a:t>
+            </a:r>
+            <a:r>
+              <a:rPr lang="en-US" sz="2000" dirty="0"/>
+              <a:t> clear host</a:t>
+            </a:r>
+            <a:endParaRPr lang="en-US" sz="2000" b="1" dirty="0"/>
+          </a:p>
+        </p:txBody>
+      </p:sp>
       <p:pic>
         <p:nvPicPr>
-          <p:cNvPr id="2050" name="Picture 2">
+          <p:cNvPr id="2054" name="Picture 6">
             <a:extLst>
               <a:ext uri="{FF2B5EF4-FFF2-40B4-BE49-F238E27FC236}">
-                <a16:creationId xmlns:a16="http://schemas.microsoft.com/office/drawing/2014/main" id="{638C9D0D-5279-489B-9EF7-E7C44AEFF012}"/>
+                <a16:creationId xmlns:a16="http://schemas.microsoft.com/office/drawing/2014/main" id="{BA113FB9-B345-453C-BC44-14FE3B507AEC}"/>
               </a:ext>
             </a:extLst>
           </p:cNvPr>
@@ -3374,8 +3442,8 @@
         </p:blipFill>
         <p:spPr bwMode="auto">
           <a:xfrm>
-            <a:off x="1233155" y="1170150"/>
-            <a:ext cx="10563225" cy="4248150"/>
+            <a:off x="348874" y="1374968"/>
+            <a:ext cx="6362700" cy="4295775"/>
           </a:xfrm>
           <a:prstGeom prst="rect">
             <a:avLst/>
@@ -3394,10 +3462,10 @@
       </p:pic>
       <p:pic>
         <p:nvPicPr>
-          <p:cNvPr id="2052" name="Picture 4">
+          <p:cNvPr id="2056" name="Picture 8">
             <a:extLst>
               <a:ext uri="{FF2B5EF4-FFF2-40B4-BE49-F238E27FC236}">
-                <a16:creationId xmlns:a16="http://schemas.microsoft.com/office/drawing/2014/main" id="{1B827339-4247-41E0-9BE5-EE2FD0EECB7F}"/>
+                <a16:creationId xmlns:a16="http://schemas.microsoft.com/office/drawing/2014/main" id="{B18F29A3-3A38-4087-B698-108E99B1370D}"/>
               </a:ext>
             </a:extLst>
           </p:cNvPr>
@@ -3421,8 +3489,8 @@
         </p:blipFill>
         <p:spPr bwMode="auto">
           <a:xfrm>
-            <a:off x="1233155" y="5641586"/>
-            <a:ext cx="10563225" cy="4295775"/>
+            <a:off x="7505065" y="1435100"/>
+            <a:ext cx="4876800" cy="4314825"/>
           </a:xfrm>
           <a:prstGeom prst="rect">
             <a:avLst/>
@@ -3439,12 +3507,156 @@
           </a:extLst>
         </p:spPr>
       </p:pic>
+      <p:sp>
+        <p:nvSpPr>
+          <p:cNvPr id="10" name="TextBox 9">
+            <a:extLst>
+              <a:ext uri="{FF2B5EF4-FFF2-40B4-BE49-F238E27FC236}">
+                <a16:creationId xmlns:a16="http://schemas.microsoft.com/office/drawing/2014/main" id="{CBEB159E-EA83-42E9-AB07-18EB16A1B7C3}"/>
+              </a:ext>
+            </a:extLst>
+          </p:cNvPr>
+          <p:cNvSpPr txBox="1"/>
+          <p:nvPr/>
+        </p:nvSpPr>
+        <p:spPr>
+          <a:xfrm>
+            <a:off x="125667" y="5873754"/>
+            <a:ext cx="4420933" cy="769441"/>
+          </a:xfrm>
+          <a:prstGeom prst="rect">
+            <a:avLst/>
+          </a:prstGeom>
+          <a:noFill/>
+        </p:spPr>
+        <p:txBody>
+          <a:bodyPr wrap="square" rtlCol="0">
+            <a:spAutoFit/>
+          </a:bodyPr>
+          <a:lstStyle/>
+          <a:p>
+            <a:r>
+              <a:rPr lang="en-US" sz="4400" b="1" dirty="0"/>
+              <a:t>c</a:t>
+            </a:r>
+            <a:r>
+              <a:rPr lang="en-US" sz="4400" dirty="0"/>
+              <a:t>) </a:t>
+            </a:r>
+            <a:r>
+              <a:rPr lang="en-US" sz="4400" i="1" dirty="0"/>
+              <a:t>E. faecalis </a:t>
+            </a:r>
+            <a:r>
+              <a:rPr lang="en-US" sz="4400" dirty="0"/>
+              <a:t>EF06</a:t>
+            </a:r>
+            <a:endParaRPr lang="en-US" sz="4400" b="1" dirty="0"/>
+          </a:p>
+        </p:txBody>
+      </p:sp>
+      <p:sp>
+        <p:nvSpPr>
+          <p:cNvPr id="11" name="TextBox 10">
+            <a:extLst>
+              <a:ext uri="{FF2B5EF4-FFF2-40B4-BE49-F238E27FC236}">
+                <a16:creationId xmlns:a16="http://schemas.microsoft.com/office/drawing/2014/main" id="{39729911-74C7-475C-83F4-4674B0A05F6B}"/>
+              </a:ext>
+            </a:extLst>
+          </p:cNvPr>
+          <p:cNvSpPr txBox="1"/>
+          <p:nvPr/>
+        </p:nvSpPr>
+        <p:spPr>
+          <a:xfrm>
+            <a:off x="6560018" y="5873754"/>
+            <a:ext cx="4209582" cy="769441"/>
+          </a:xfrm>
+          <a:prstGeom prst="rect">
+            <a:avLst/>
+          </a:prstGeom>
+          <a:noFill/>
+        </p:spPr>
+        <p:txBody>
+          <a:bodyPr wrap="square" rtlCol="0">
+            <a:spAutoFit/>
+          </a:bodyPr>
+          <a:lstStyle/>
+          <a:p>
+            <a:r>
+              <a:rPr lang="en-US" sz="4400" b="1" dirty="0"/>
+              <a:t>d</a:t>
+            </a:r>
+            <a:r>
+              <a:rPr lang="en-US" sz="4400" dirty="0"/>
+              <a:t>) </a:t>
+            </a:r>
+            <a:r>
+              <a:rPr lang="en-US" sz="4400" i="1" dirty="0"/>
+              <a:t>E. faecalis </a:t>
+            </a:r>
+            <a:r>
+              <a:rPr lang="en-US" sz="4400" dirty="0"/>
+              <a:t>Ef11</a:t>
+            </a:r>
+            <a:endParaRPr lang="en-US" sz="4400" b="1" dirty="0"/>
+          </a:p>
+        </p:txBody>
+      </p:sp>
+      <p:sp>
+        <p:nvSpPr>
+          <p:cNvPr id="12" name="TextBox 11">
+            <a:extLst>
+              <a:ext uri="{FF2B5EF4-FFF2-40B4-BE49-F238E27FC236}">
+                <a16:creationId xmlns:a16="http://schemas.microsoft.com/office/drawing/2014/main" id="{F14D093C-BD00-4A85-AC88-01C4C31DD11B}"/>
+              </a:ext>
+            </a:extLst>
+          </p:cNvPr>
+          <p:cNvSpPr txBox="1"/>
+          <p:nvPr/>
+        </p:nvSpPr>
+        <p:spPr>
+          <a:xfrm>
+            <a:off x="12132328" y="5873754"/>
+            <a:ext cx="4584408" cy="769441"/>
+          </a:xfrm>
+          <a:prstGeom prst="rect">
+            <a:avLst/>
+          </a:prstGeom>
+          <a:noFill/>
+        </p:spPr>
+        <p:txBody>
+          <a:bodyPr wrap="square" rtlCol="0">
+            <a:spAutoFit/>
+          </a:bodyPr>
+          <a:lstStyle/>
+          <a:p>
+            <a:r>
+              <a:rPr lang="en-US" sz="4400" b="1" dirty="0"/>
+              <a:t>e</a:t>
+            </a:r>
+            <a:r>
+              <a:rPr lang="en-US" sz="4400" dirty="0"/>
+              <a:t>) </a:t>
+            </a:r>
+            <a:r>
+              <a:rPr lang="en-US" sz="4400" i="1" dirty="0"/>
+              <a:t>E. faecalis </a:t>
+            </a:r>
+            <a:r>
+              <a:rPr lang="en-US" sz="4400" dirty="0"/>
+              <a:t>V587</a:t>
+            </a:r>
+            <a:endParaRPr lang="en-US" sz="4400" b="1" dirty="0"/>
+          </a:p>
+        </p:txBody>
+      </p:sp>
       <p:pic>
         <p:nvPicPr>
-          <p:cNvPr id="2054" name="Picture 6">
+          <p:cNvPr id="14" name="Picture 2">
             <a:extLst>
               <a:ext uri="{FF2B5EF4-FFF2-40B4-BE49-F238E27FC236}">
-                <a16:creationId xmlns:a16="http://schemas.microsoft.com/office/drawing/2014/main" id="{DF7972CE-2B3F-4FD4-A570-10BFA88436B5}"/>
+                <a16:creationId xmlns:a16="http://schemas.microsoft.com/office/drawing/2014/main" id="{01B72A8F-3169-4D4F-A3EF-FE7D26318E5A}"/>
               </a:ext>
             </a:extLst>
           </p:cNvPr>
@@ -3468,8 +3680,8 @@
         </p:blipFill>
         <p:spPr bwMode="auto">
           <a:xfrm>
-            <a:off x="1233155" y="10160647"/>
-            <a:ext cx="8867775" cy="4314825"/>
+            <a:off x="460667" y="6735528"/>
+            <a:ext cx="5724525" cy="4295775"/>
           </a:xfrm>
           <a:prstGeom prst="rect">
             <a:avLst/>
@@ -3486,6 +3698,192 @@
           </a:extLst>
         </p:spPr>
       </p:pic>
+      <p:pic>
+        <p:nvPicPr>
+          <p:cNvPr id="17" name="Picture 4">
+            <a:extLst>
+              <a:ext uri="{FF2B5EF4-FFF2-40B4-BE49-F238E27FC236}">
+                <a16:creationId xmlns:a16="http://schemas.microsoft.com/office/drawing/2014/main" id="{A0B3F7BA-2A43-40B8-8A29-9F3C1905A589}"/>
+              </a:ext>
+            </a:extLst>
+          </p:cNvPr>
+          <p:cNvPicPr>
+            <a:picLocks noChangeAspect="1" noChangeArrowheads="1"/>
+          </p:cNvPicPr>
+          <p:nvPr/>
+        </p:nvPicPr>
+        <p:blipFill>
+          <a:blip r:embed="rId5">
+            <a:extLst>
+              <a:ext uri="{28A0092B-C50C-407E-A947-70E740481C1C}">
+                <a14:useLocalDpi xmlns:a14="http://schemas.microsoft.com/office/drawing/2010/main" val="0"/>
+              </a:ext>
+            </a:extLst>
+          </a:blip>
+          <a:srcRect/>
+          <a:stretch>
+            <a:fillRect/>
+          </a:stretch>
+        </p:blipFill>
+        <p:spPr bwMode="auto">
+          <a:xfrm>
+            <a:off x="6510968" y="6827615"/>
+            <a:ext cx="4876800" cy="4314825"/>
+          </a:xfrm>
+          <a:prstGeom prst="rect">
+            <a:avLst/>
+          </a:prstGeom>
+          <a:noFill/>
+          <a:extLst>
+            <a:ext uri="{909E8E84-426E-40DD-AFC4-6F175D3DCCD1}">
+              <a14:hiddenFill xmlns:a14="http://schemas.microsoft.com/office/drawing/2010/main">
+                <a:solidFill>
+                  <a:srgbClr val="FFFFFF"/>
+                </a:solidFill>
+              </a14:hiddenFill>
+            </a:ext>
+          </a:extLst>
+        </p:spPr>
+      </p:pic>
+      <p:pic>
+        <p:nvPicPr>
+          <p:cNvPr id="2050" name="Picture 2">
+            <a:extLst>
+              <a:ext uri="{FF2B5EF4-FFF2-40B4-BE49-F238E27FC236}">
+                <a16:creationId xmlns:a16="http://schemas.microsoft.com/office/drawing/2014/main" id="{199A1B3D-1EAE-41D9-B404-19CA8C889B60}"/>
+              </a:ext>
+            </a:extLst>
+          </p:cNvPr>
+          <p:cNvPicPr>
+            <a:picLocks noChangeAspect="1" noChangeArrowheads="1"/>
+          </p:cNvPicPr>
+          <p:nvPr/>
+        </p:nvPicPr>
+        <p:blipFill>
+          <a:blip r:embed="rId6">
+            <a:extLst>
+              <a:ext uri="{28A0092B-C50C-407E-A947-70E740481C1C}">
+                <a14:useLocalDpi xmlns:a14="http://schemas.microsoft.com/office/drawing/2010/main" val="0"/>
+              </a:ext>
+            </a:extLst>
+          </a:blip>
+          <a:srcRect/>
+          <a:stretch>
+            <a:fillRect/>
+          </a:stretch>
+        </p:blipFill>
+        <p:spPr bwMode="auto">
+          <a:xfrm>
+            <a:off x="12132328" y="6735528"/>
+            <a:ext cx="5381625" cy="4171950"/>
+          </a:xfrm>
+          <a:prstGeom prst="rect">
+            <a:avLst/>
+          </a:prstGeom>
+          <a:noFill/>
+          <a:extLst>
+            <a:ext uri="{909E8E84-426E-40DD-AFC4-6F175D3DCCD1}">
+              <a14:hiddenFill xmlns:a14="http://schemas.microsoft.com/office/drawing/2010/main">
+                <a:solidFill>
+                  <a:srgbClr val="FFFFFF"/>
+                </a:solidFill>
+              </a14:hiddenFill>
+            </a:ext>
+          </a:extLst>
+        </p:spPr>
+      </p:pic>
+      <p:sp>
+        <p:nvSpPr>
+          <p:cNvPr id="3" name="TextBox 2">
+            <a:extLst>
+              <a:ext uri="{FF2B5EF4-FFF2-40B4-BE49-F238E27FC236}">
+                <a16:creationId xmlns:a16="http://schemas.microsoft.com/office/drawing/2014/main" id="{BD07CFFF-0A63-4630-B0EB-1D9FF00B6764}"/>
+              </a:ext>
+            </a:extLst>
+          </p:cNvPr>
+          <p:cNvSpPr txBox="1"/>
+          <p:nvPr/>
+        </p:nvSpPr>
+        <p:spPr>
+          <a:xfrm>
+            <a:off x="7547611" y="243870"/>
+            <a:ext cx="4288790" cy="1077218"/>
+          </a:xfrm>
+          <a:prstGeom prst="rect">
+            <a:avLst/>
+          </a:prstGeom>
+          <a:noFill/>
+        </p:spPr>
+        <p:txBody>
+          <a:bodyPr wrap="square" rtlCol="0">
+            <a:spAutoFit/>
+          </a:bodyPr>
+          <a:lstStyle/>
+          <a:p>
+            <a:r>
+              <a:rPr lang="en-US" sz="4400" b="1" dirty="0"/>
+              <a:t>b</a:t>
+            </a:r>
+            <a:r>
+              <a:rPr lang="en-US" sz="4400" dirty="0"/>
+              <a:t>) </a:t>
+            </a:r>
+            <a:r>
+              <a:rPr lang="en-US" sz="4400" i="1" dirty="0"/>
+              <a:t>E. faecalis </a:t>
+            </a:r>
+            <a:r>
+              <a:rPr lang="en-US" sz="4400" dirty="0"/>
+              <a:t>YI6</a:t>
+            </a:r>
+          </a:p>
+          <a:p>
+            <a:r>
+              <a:rPr lang="en-US" sz="2000" dirty="0"/>
+              <a:t>	Individual phages </a:t>
+            </a:r>
+            <a:r>
+              <a:rPr lang="en-US" sz="2000" b="1" dirty="0"/>
+              <a:t>do</a:t>
+            </a:r>
+            <a:r>
+              <a:rPr lang="en-US" sz="2000" dirty="0"/>
+              <a:t> clear host</a:t>
+            </a:r>
+            <a:endParaRPr lang="en-US" sz="2000" b="1" dirty="0"/>
+          </a:p>
+        </p:txBody>
+      </p:sp>
+    </p:spTree>
+    <p:extLst>
+      <p:ext uri="{BB962C8B-B14F-4D97-AF65-F5344CB8AC3E}">
+        <p14:creationId xmlns:p14="http://schemas.microsoft.com/office/powerpoint/2010/main" val="1367113770"/>
+      </p:ext>
+    </p:extLst>
+  </p:cSld>
+  <p:clrMapOvr>
+    <a:masterClrMapping/>
+  </p:clrMapOvr>
+</p:sld>
+</file>
+
+<file path=ppt/slides/slide3.xml><?xml version="1.0" encoding="utf-8"?>
+<p:sld xmlns:a="http://schemas.openxmlformats.org/drawingml/2006/main" xmlns:r="http://schemas.openxmlformats.org/officeDocument/2006/relationships" xmlns:p="http://schemas.openxmlformats.org/presentationml/2006/main">
+  <p:cSld>
+    <p:spTree>
+      <p:nvGrpSpPr>
+        <p:cNvPr id="1" name=""/>
+        <p:cNvGrpSpPr/>
+        <p:nvPr/>
+      </p:nvGrpSpPr>
+      <p:grpSpPr>
+        <a:xfrm>
+          <a:off x="0" y="0"/>
+          <a:ext cx="0" cy="0"/>
+          <a:chOff x="0" y="0"/>
+          <a:chExt cx="0" cy="0"/>
+        </a:xfrm>
+      </p:grpSpPr>
       <p:sp>
         <p:nvSpPr>
           <p:cNvPr id="4" name="TextBox 3">
@@ -3606,6 +4004,147 @@
           </a:p>
         </p:txBody>
       </p:sp>
+      <p:pic>
+        <p:nvPicPr>
+          <p:cNvPr id="3074" name="Picture 2">
+            <a:extLst>
+              <a:ext uri="{FF2B5EF4-FFF2-40B4-BE49-F238E27FC236}">
+                <a16:creationId xmlns:a16="http://schemas.microsoft.com/office/drawing/2014/main" id="{B3CF8EA0-48B6-4879-A06C-FE0C57B63323}"/>
+              </a:ext>
+            </a:extLst>
+          </p:cNvPr>
+          <p:cNvPicPr>
+            <a:picLocks noChangeAspect="1" noChangeArrowheads="1"/>
+          </p:cNvPicPr>
+          <p:nvPr/>
+        </p:nvPicPr>
+        <p:blipFill>
+          <a:blip r:embed="rId2">
+            <a:extLst>
+              <a:ext uri="{28A0092B-C50C-407E-A947-70E740481C1C}">
+                <a14:useLocalDpi xmlns:a14="http://schemas.microsoft.com/office/drawing/2010/main" val="0"/>
+              </a:ext>
+            </a:extLst>
+          </a:blip>
+          <a:srcRect/>
+          <a:stretch>
+            <a:fillRect/>
+          </a:stretch>
+        </p:blipFill>
+        <p:spPr bwMode="auto">
+          <a:xfrm>
+            <a:off x="615633" y="1226141"/>
+            <a:ext cx="10563225" cy="4248150"/>
+          </a:xfrm>
+          <a:prstGeom prst="rect">
+            <a:avLst/>
+          </a:prstGeom>
+          <a:noFill/>
+          <a:extLst>
+            <a:ext uri="{909E8E84-426E-40DD-AFC4-6F175D3DCCD1}">
+              <a14:hiddenFill xmlns:a14="http://schemas.microsoft.com/office/drawing/2010/main">
+                <a:solidFill>
+                  <a:srgbClr val="FFFFFF"/>
+                </a:solidFill>
+              </a14:hiddenFill>
+            </a:ext>
+          </a:extLst>
+        </p:spPr>
+      </p:pic>
+      <p:pic>
+        <p:nvPicPr>
+          <p:cNvPr id="3076" name="Picture 4">
+            <a:extLst>
+              <a:ext uri="{FF2B5EF4-FFF2-40B4-BE49-F238E27FC236}">
+                <a16:creationId xmlns:a16="http://schemas.microsoft.com/office/drawing/2014/main" id="{DEB1BAE8-17C0-4A16-AAC9-D50A8C454B24}"/>
+              </a:ext>
+            </a:extLst>
+          </p:cNvPr>
+          <p:cNvPicPr>
+            <a:picLocks noChangeAspect="1" noChangeArrowheads="1"/>
+          </p:cNvPicPr>
+          <p:nvPr/>
+        </p:nvPicPr>
+        <p:blipFill>
+          <a:blip r:embed="rId3">
+            <a:extLst>
+              <a:ext uri="{28A0092B-C50C-407E-A947-70E740481C1C}">
+                <a14:useLocalDpi xmlns:a14="http://schemas.microsoft.com/office/drawing/2010/main" val="0"/>
+              </a:ext>
+            </a:extLst>
+          </a:blip>
+          <a:srcRect/>
+          <a:stretch>
+            <a:fillRect/>
+          </a:stretch>
+        </p:blipFill>
+        <p:spPr bwMode="auto">
+          <a:xfrm>
+            <a:off x="615633" y="5810903"/>
+            <a:ext cx="11839575" cy="4295775"/>
+          </a:xfrm>
+          <a:prstGeom prst="rect">
+            <a:avLst/>
+          </a:prstGeom>
+          <a:noFill/>
+          <a:extLst>
+            <a:ext uri="{909E8E84-426E-40DD-AFC4-6F175D3DCCD1}">
+              <a14:hiddenFill xmlns:a14="http://schemas.microsoft.com/office/drawing/2010/main">
+                <a:solidFill>
+                  <a:srgbClr val="FFFFFF"/>
+                </a:solidFill>
+              </a14:hiddenFill>
+            </a:ext>
+          </a:extLst>
+        </p:spPr>
+      </p:pic>
+      <p:pic>
+        <p:nvPicPr>
+          <p:cNvPr id="3078" name="Picture 6">
+            <a:extLst>
+              <a:ext uri="{FF2B5EF4-FFF2-40B4-BE49-F238E27FC236}">
+                <a16:creationId xmlns:a16="http://schemas.microsoft.com/office/drawing/2014/main" id="{5EF59F0C-200E-4D05-B4F7-80FAFAD73FD4}"/>
+              </a:ext>
+            </a:extLst>
+          </p:cNvPr>
+          <p:cNvPicPr>
+            <a:picLocks noChangeAspect="1" noChangeArrowheads="1"/>
+          </p:cNvPicPr>
+          <p:nvPr/>
+        </p:nvPicPr>
+        <p:blipFill>
+          <a:blip r:embed="rId4">
+            <a:extLst>
+              <a:ext uri="{28A0092B-C50C-407E-A947-70E740481C1C}">
+                <a14:useLocalDpi xmlns:a14="http://schemas.microsoft.com/office/drawing/2010/main" val="0"/>
+              </a:ext>
+            </a:extLst>
+          </a:blip>
+          <a:srcRect/>
+          <a:stretch>
+            <a:fillRect/>
+          </a:stretch>
+        </p:blipFill>
+        <p:spPr bwMode="auto">
+          <a:xfrm>
+            <a:off x="615633" y="10443290"/>
+            <a:ext cx="10144125" cy="4314825"/>
+          </a:xfrm>
+          <a:prstGeom prst="rect">
+            <a:avLst/>
+          </a:prstGeom>
+          <a:noFill/>
+          <a:extLst>
+            <a:ext uri="{909E8E84-426E-40DD-AFC4-6F175D3DCCD1}">
+              <a14:hiddenFill xmlns:a14="http://schemas.microsoft.com/office/drawing/2010/main">
+                <a:solidFill>
+                  <a:srgbClr val="FFFFFF"/>
+                </a:solidFill>
+              </a14:hiddenFill>
+            </a:ext>
+          </a:extLst>
+        </p:spPr>
+      </p:pic>
     </p:spTree>
     <p:extLst>
       <p:ext uri="{BB962C8B-B14F-4D97-AF65-F5344CB8AC3E}">

</xml_diff>